<commit_message>
Actualizado cosas de la presentación
</commit_message>
<xml_diff>
--- a/slides/plantilla_usada.pptx
+++ b/slides/plantilla_usada.pptx
@@ -21,8 +21,8 @@
     <p:sldId id="285" r:id="rId9"/>
     <p:sldId id="271" r:id="rId10"/>
     <p:sldId id="268" r:id="rId11"/>
-    <p:sldId id="289" r:id="rId12"/>
-    <p:sldId id="286" r:id="rId13"/>
+    <p:sldId id="292" r:id="rId12"/>
+    <p:sldId id="297" r:id="rId13"/>
     <p:sldId id="290" r:id="rId14"/>
     <p:sldId id="287" r:id="rId15"/>
     <p:sldId id="288" r:id="rId16"/>
@@ -246,7 +246,7 @@
           <a:p>
             <a:fld id="{A85139BE-39D6-4EEC-90F8-B6B26E4D6216}" type="datetimeFigureOut">
               <a:rPr lang="es-ES" smtClean="0"/>
-              <a:t>30/05/2022</a:t>
+              <a:t>02/06/2022</a:t>
             </a:fld>
             <a:endParaRPr lang="es-ES"/>
           </a:p>
@@ -411,7 +411,7 @@
           <a:p>
             <a:fld id="{DB0A5BE9-06C5-483C-B766-6AF9F206FB90}" type="datetimeFigureOut">
               <a:rPr lang="es-ES" smtClean="0"/>
-              <a:t>30/05/2022</a:t>
+              <a:t>02/06/2022</a:t>
             </a:fld>
             <a:endParaRPr lang="es-ES"/>
           </a:p>
@@ -1294,7 +1294,7 @@
         <p:spPr>
           <a:xfrm>
             <a:off x="683568" y="915566"/>
-            <a:ext cx="7704856" cy="2616101"/>
+            <a:ext cx="6456782" cy="3929281"/>
           </a:xfrm>
           <a:prstGeom prst="rect">
             <a:avLst/>
@@ -1319,17 +1319,9 @@
             </a:r>
           </a:p>
           <a:p>
-            <a:pPr marL="342900" indent="-342900">
-              <a:buFont typeface="Arial" panose="020B0604020202020204" pitchFamily="34" charset="0"/>
-              <a:buChar char="•"/>
-            </a:pPr>
             <a:endParaRPr lang="es-ES_tradnl" sz="3200" baseline="30000" dirty="0"/>
           </a:p>
           <a:p>
-            <a:pPr marL="342900" indent="-342900">
-              <a:buFont typeface="Arial" panose="020B0604020202020204" pitchFamily="34" charset="0"/>
-              <a:buChar char="•"/>
-            </a:pPr>
             <a:endParaRPr lang="es-ES_tradnl" sz="3200" baseline="30000" dirty="0"/>
           </a:p>
           <a:p>
@@ -1339,17 +1331,7 @@
             </a:pPr>
             <a:r>
               <a:rPr lang="es-ES" sz="3200" baseline="30000" dirty="0"/>
-              <a:t>La lógica proposicional no tiene la percepción de tiempo.</a:t>
-            </a:r>
-          </a:p>
-          <a:p>
-            <a:pPr marL="342900" indent="-342900">
-              <a:buFont typeface="Arial" panose="020B0604020202020204" pitchFamily="34" charset="0"/>
-              <a:buChar char="•"/>
-            </a:pPr>
-            <a:r>
-              <a:rPr lang="es-ES" sz="3200" baseline="30000" dirty="0"/>
-              <a:t>Hechos que son verdaderos o falsos.</a:t>
+              <a:t>La lógica temporal tiene percepción de tiempo, al contrario que la proposicional.</a:t>
             </a:r>
           </a:p>
           <a:p>
@@ -1359,7 +1341,7 @@
             </a:pPr>
             <a:r>
               <a:rPr lang="es-ES_tradnl" sz="3200" baseline="30000" dirty="0"/>
-              <a:t>El controlador software de un sistema </a:t>
+              <a:t>Un controlador software de un sistema </a:t>
             </a:r>
             <a:r>
               <a:rPr lang="es-ES_tradnl" sz="3200" baseline="30000" dirty="0" err="1"/>
@@ -1367,8 +1349,35 @@
             </a:r>
             <a:r>
               <a:rPr lang="es-ES_tradnl" sz="3200" baseline="30000" dirty="0"/>
-              <a:t> se representa como una máquina de estados</a:t>
-            </a:r>
+              <a:t> se representa como una máquina de estados.</a:t>
+            </a:r>
+          </a:p>
+          <a:p>
+            <a:pPr marL="342900" indent="-342900">
+              <a:buFont typeface="Arial" panose="020B0604020202020204" pitchFamily="34" charset="0"/>
+              <a:buChar char="•"/>
+            </a:pPr>
+            <a:r>
+              <a:rPr lang="es-ES" sz="3200" baseline="30000" dirty="0"/>
+              <a:t>Hechos que son verdaderos o falsos, dependiendo del estado.</a:t>
+            </a:r>
+          </a:p>
+          <a:p>
+            <a:pPr marL="342900" indent="-342900">
+              <a:buFont typeface="Arial" panose="020B0604020202020204" pitchFamily="34" charset="0"/>
+              <a:buChar char="•"/>
+            </a:pPr>
+            <a:r>
+              <a:rPr lang="es-ES" sz="3200" baseline="30000" dirty="0"/>
+              <a:t>En un entorno real, el tiempo es denso.</a:t>
+            </a:r>
+          </a:p>
+          <a:p>
+            <a:pPr marL="342900" indent="-342900">
+              <a:buFont typeface="Arial" panose="020B0604020202020204" pitchFamily="34" charset="0"/>
+              <a:buChar char="•"/>
+            </a:pPr>
+            <a:endParaRPr lang="es-ES_tradnl" sz="3200" baseline="30000" dirty="0"/>
           </a:p>
         </p:txBody>
       </p:sp>
@@ -1451,6 +1460,42 @@
           </a:p>
         </p:txBody>
       </p:sp>
+      <p:pic>
+        <p:nvPicPr>
+          <p:cNvPr id="3" name="Imagen 2" descr="Imagen de la pantalla de un celular con letras&#10;&#10;Descripción generada automáticamente con confianza media">
+            <a:extLst>
+              <a:ext uri="{FF2B5EF4-FFF2-40B4-BE49-F238E27FC236}">
+                <a16:creationId xmlns:a16="http://schemas.microsoft.com/office/drawing/2014/main" id="{3C907599-BF85-4D3C-9FF1-A819F4B92AE8}"/>
+              </a:ext>
+            </a:extLst>
+          </p:cNvPr>
+          <p:cNvPicPr>
+            <a:picLocks noChangeAspect="1"/>
+          </p:cNvPicPr>
+          <p:nvPr/>
+        </p:nvPicPr>
+        <p:blipFill>
+          <a:blip r:embed="rId2" cstate="print">
+            <a:extLst>
+              <a:ext uri="{28A0092B-C50C-407E-A947-70E740481C1C}">
+                <a14:useLocalDpi xmlns:a14="http://schemas.microsoft.com/office/drawing/2010/main" val="0"/>
+              </a:ext>
+            </a:extLst>
+          </a:blip>
+          <a:stretch>
+            <a:fillRect/>
+          </a:stretch>
+        </p:blipFill>
+        <p:spPr>
+          <a:xfrm>
+            <a:off x="6804248" y="2108074"/>
+            <a:ext cx="2143496" cy="1544264"/>
+          </a:xfrm>
+          <a:prstGeom prst="rect">
+            <a:avLst/>
+          </a:prstGeom>
+        </p:spPr>
+      </p:pic>
     </p:spTree>
     <p:extLst>
       <p:ext uri="{BB962C8B-B14F-4D97-AF65-F5344CB8AC3E}">
@@ -1490,7 +1535,7 @@
         <p:spPr>
           <a:xfrm>
             <a:off x="683568" y="915566"/>
-            <a:ext cx="4104456" cy="2944396"/>
+            <a:ext cx="7776864" cy="3600986"/>
           </a:xfrm>
           <a:prstGeom prst="rect">
             <a:avLst/>
@@ -1504,14 +1549,34 @@
           <a:lstStyle/>
           <a:p>
             <a:r>
-              <a:rPr lang="es-ES" sz="3600" b="1" kern="0" dirty="0">
+              <a:rPr lang="es-ES_tradnl" sz="3600" b="1" kern="0" dirty="0" err="1">
                 <a:solidFill>
                   <a:schemeClr val="bg1">
                     <a:lumMod val="50000"/>
                   </a:schemeClr>
                 </a:solidFill>
               </a:rPr>
-              <a:t>Derivada</a:t>
+              <a:t>Signal</a:t>
+            </a:r>
+            <a:r>
+              <a:rPr lang="es-ES_tradnl" sz="3600" b="1" kern="0" dirty="0">
+                <a:solidFill>
+                  <a:schemeClr val="bg1">
+                    <a:lumMod val="50000"/>
+                  </a:schemeClr>
+                </a:solidFill>
+              </a:rPr>
+              <a:t> Temporal </a:t>
+            </a:r>
+            <a:r>
+              <a:rPr lang="es-ES_tradnl" sz="3600" b="1" kern="0" dirty="0" err="1">
+                <a:solidFill>
+                  <a:schemeClr val="bg1">
+                    <a:lumMod val="50000"/>
+                  </a:schemeClr>
+                </a:solidFill>
+              </a:rPr>
+              <a:t>Logic</a:t>
             </a:r>
             <a:endParaRPr lang="es-ES_tradnl" sz="3600" b="1" kern="0" dirty="0">
               <a:solidFill>
@@ -1522,24 +1587,19 @@
             </a:endParaRPr>
           </a:p>
           <a:p>
-            <a:pPr marL="342900" indent="-342900">
-              <a:buFont typeface="Arial" panose="020B0604020202020204" pitchFamily="34" charset="0"/>
-              <a:buChar char="•"/>
-            </a:pPr>
             <a:endParaRPr lang="es-ES_tradnl" sz="3200" baseline="30000" dirty="0"/>
           </a:p>
           <a:p>
-            <a:pPr marL="342900" indent="-342900">
-              <a:buFont typeface="Arial" panose="020B0604020202020204" pitchFamily="34" charset="0"/>
-              <a:buChar char="•"/>
-            </a:pPr>
-            <a:r>
-              <a:rPr lang="en-US" sz="3200" baseline="30000" dirty="0"/>
-              <a:t>E</a:t>
-            </a:r>
+            <a:endParaRPr lang="es-ES_tradnl" sz="3200" baseline="30000" dirty="0"/>
+          </a:p>
+          <a:p>
+            <a:pPr marL="342900" indent="-342900">
+              <a:buFont typeface="Arial" panose="020B0604020202020204" pitchFamily="34" charset="0"/>
+              <a:buChar char="•"/>
+            </a:pPr>
             <a:r>
               <a:rPr lang="es-ES" sz="3200" baseline="30000" dirty="0"/>
-              <a:t>l valor de la pendiente de una recta tangente en un punto cualquiera de una curva.</a:t>
+              <a:t>Un tipo de lógica temporal dedicada a señales analógicas.</a:t>
             </a:r>
           </a:p>
           <a:p>
@@ -1549,9 +1609,39 @@
             </a:pPr>
             <a:r>
               <a:rPr lang="es-ES" sz="3200" baseline="30000" dirty="0"/>
-              <a:t>Vemos la evolución o cambio de algún fenómeno, en nuestro caso las señales.</a:t>
-            </a:r>
-            <a:endParaRPr lang="es-ES_tradnl" sz="2000" baseline="30000" dirty="0"/>
+              <a:t>Permite expresar características sobre la evolución de algún atributo físico.</a:t>
+            </a:r>
+          </a:p>
+          <a:p>
+            <a:pPr marL="342900" indent="-342900">
+              <a:buFont typeface="Arial" panose="020B0604020202020204" pitchFamily="34" charset="0"/>
+              <a:buChar char="•"/>
+            </a:pPr>
+            <a:r>
+              <a:rPr lang="es-ES" sz="3200" baseline="30000" dirty="0"/>
+              <a:t>Las propiedades de la lógica se satisfacen con un estado o un camino.</a:t>
+            </a:r>
+          </a:p>
+          <a:p>
+            <a:pPr marL="342900" indent="-342900">
+              <a:buFont typeface="Arial" panose="020B0604020202020204" pitchFamily="34" charset="0"/>
+              <a:buChar char="•"/>
+            </a:pPr>
+            <a:r>
+              <a:rPr lang="es-ES" sz="3200" baseline="30000" dirty="0" err="1"/>
+              <a:t>STLEval</a:t>
+            </a:r>
+            <a:r>
+              <a:rPr lang="es-ES" sz="3200" baseline="30000" dirty="0"/>
+              <a:t> es un intérprete de STL con extensiones cuantitativas.</a:t>
+            </a:r>
+          </a:p>
+          <a:p>
+            <a:pPr marL="342900" indent="-342900">
+              <a:buFont typeface="Arial" panose="020B0604020202020204" pitchFamily="34" charset="0"/>
+              <a:buChar char="•"/>
+            </a:pPr>
+            <a:endParaRPr lang="es-ES_tradnl" sz="3200" baseline="30000" dirty="0"/>
           </a:p>
         </p:txBody>
       </p:sp>
@@ -1634,40 +1724,10 @@
           </a:p>
         </p:txBody>
       </p:sp>
-      <p:pic>
-        <p:nvPicPr>
-          <p:cNvPr id="3" name="Imagen 2">
-            <a:extLst>
-              <a:ext uri="{FF2B5EF4-FFF2-40B4-BE49-F238E27FC236}">
-                <a16:creationId xmlns:a16="http://schemas.microsoft.com/office/drawing/2014/main" id="{D9279D68-4AE8-A21F-6CAA-5207363F0797}"/>
-              </a:ext>
-            </a:extLst>
-          </p:cNvPr>
-          <p:cNvPicPr>
-            <a:picLocks noChangeAspect="1"/>
-          </p:cNvPicPr>
-          <p:nvPr/>
-        </p:nvPicPr>
-        <p:blipFill>
-          <a:blip r:embed="rId2"/>
-          <a:stretch>
-            <a:fillRect/>
-          </a:stretch>
-        </p:blipFill>
-        <p:spPr>
-          <a:xfrm>
-            <a:off x="5580112" y="1053014"/>
-            <a:ext cx="2968294" cy="3037471"/>
-          </a:xfrm>
-          <a:prstGeom prst="rect">
-            <a:avLst/>
-          </a:prstGeom>
-        </p:spPr>
-      </p:pic>
     </p:spTree>
     <p:extLst>
       <p:ext uri="{BB962C8B-B14F-4D97-AF65-F5344CB8AC3E}">
-        <p14:creationId xmlns:p14="http://schemas.microsoft.com/office/powerpoint/2010/main" val="3266846819"/>
+        <p14:creationId xmlns:p14="http://schemas.microsoft.com/office/powerpoint/2010/main" val="549219081"/>
       </p:ext>
     </p:extLst>
   </p:cSld>
@@ -1703,7 +1763,7 @@
         <p:spPr>
           <a:xfrm>
             <a:off x="683568" y="915566"/>
-            <a:ext cx="3960440" cy="2821285"/>
+            <a:ext cx="7488832" cy="646331"/>
           </a:xfrm>
           <a:prstGeom prst="rect">
             <a:avLst/>
@@ -1724,40 +1784,15 @@
                   </a:schemeClr>
                 </a:solidFill>
               </a:rPr>
-              <a:t>Integral</a:t>
-            </a:r>
-            <a:endParaRPr lang="es-ES_tradnl" sz="3200" baseline="30000" dirty="0"/>
-          </a:p>
-          <a:p>
-            <a:pPr marL="342900" indent="-342900">
-              <a:buFont typeface="Arial" panose="020B0604020202020204" pitchFamily="34" charset="0"/>
-              <a:buChar char="•"/>
-            </a:pPr>
-            <a:endParaRPr lang="es-ES_tradnl" sz="3200" baseline="30000" dirty="0"/>
-          </a:p>
-          <a:p>
-            <a:pPr marL="342900" indent="-342900">
-              <a:buFont typeface="Arial" panose="020B0604020202020204" pitchFamily="34" charset="0"/>
-              <a:buChar char="•"/>
-            </a:pPr>
-            <a:r>
-              <a:rPr lang="es-ES" sz="3200" baseline="30000" dirty="0"/>
-              <a:t>Cálculo del área debajo de la curva que se realiza mediante la suma de infinitos sumandos extremadamente pequeños.</a:t>
-            </a:r>
-          </a:p>
-          <a:p>
-            <a:pPr marL="342900" indent="-342900">
-              <a:buFont typeface="Arial" panose="020B0604020202020204" pitchFamily="34" charset="0"/>
-              <a:buChar char="•"/>
-            </a:pPr>
-            <a:endParaRPr lang="es-ES" sz="3200" baseline="30000" dirty="0"/>
-          </a:p>
-          <a:p>
-            <a:pPr marL="342900" indent="-342900">
-              <a:buFont typeface="Arial" panose="020B0604020202020204" pitchFamily="34" charset="0"/>
-              <a:buChar char="•"/>
-            </a:pPr>
-            <a:endParaRPr lang="es-ES_tradnl" sz="2000" baseline="30000" dirty="0"/>
+              <a:t>Definición de los nuevos operadores</a:t>
+            </a:r>
+            <a:endParaRPr lang="es-ES_tradnl" sz="3600" b="1" kern="0" dirty="0">
+              <a:solidFill>
+                <a:schemeClr val="bg1">
+                  <a:lumMod val="50000"/>
+                </a:schemeClr>
+              </a:solidFill>
+            </a:endParaRPr>
           </a:p>
         </p:txBody>
       </p:sp>
@@ -1842,10 +1877,10 @@
       </p:sp>
       <p:pic>
         <p:nvPicPr>
-          <p:cNvPr id="3" name="Imagen 2">
+          <p:cNvPr id="3" name="Imagen 2" descr="Gráfico&#10;&#10;Descripción generada automáticamente">
             <a:extLst>
               <a:ext uri="{FF2B5EF4-FFF2-40B4-BE49-F238E27FC236}">
-                <a16:creationId xmlns:a16="http://schemas.microsoft.com/office/drawing/2014/main" id="{96894397-1318-DE52-3EB3-7115BCE86468}"/>
+                <a16:creationId xmlns:a16="http://schemas.microsoft.com/office/drawing/2014/main" id="{A5F01666-C005-41DF-AC62-D2444E0C8101}"/>
               </a:ext>
             </a:extLst>
           </p:cNvPr>
@@ -1855,15 +1890,57 @@
           <p:nvPr/>
         </p:nvPicPr>
         <p:blipFill>
-          <a:blip r:embed="rId2"/>
+          <a:blip r:embed="rId2" cstate="print">
+            <a:extLst>
+              <a:ext uri="{28A0092B-C50C-407E-A947-70E740481C1C}">
+                <a14:useLocalDpi xmlns:a14="http://schemas.microsoft.com/office/drawing/2010/main" val="0"/>
+              </a:ext>
+            </a:extLst>
+          </a:blip>
           <a:stretch>
             <a:fillRect/>
           </a:stretch>
         </p:blipFill>
         <p:spPr>
           <a:xfrm>
-            <a:off x="5681840" y="1203598"/>
-            <a:ext cx="2917020" cy="3167437"/>
+            <a:off x="402490" y="1926229"/>
+            <a:ext cx="3791247" cy="2621430"/>
+          </a:xfrm>
+          <a:prstGeom prst="rect">
+            <a:avLst/>
+          </a:prstGeom>
+        </p:spPr>
+      </p:pic>
+      <p:pic>
+        <p:nvPicPr>
+          <p:cNvPr id="8" name="Imagen 7" descr="Gráfico, Histograma&#10;&#10;Descripción generada automáticamente">
+            <a:extLst>
+              <a:ext uri="{FF2B5EF4-FFF2-40B4-BE49-F238E27FC236}">
+                <a16:creationId xmlns:a16="http://schemas.microsoft.com/office/drawing/2014/main" id="{0F138A34-C165-4E69-9661-AFA07F61AC55}"/>
+              </a:ext>
+            </a:extLst>
+          </p:cNvPr>
+          <p:cNvPicPr>
+            <a:picLocks noChangeAspect="1"/>
+          </p:cNvPicPr>
+          <p:nvPr/>
+        </p:nvPicPr>
+        <p:blipFill>
+          <a:blip r:embed="rId3" cstate="print">
+            <a:extLst>
+              <a:ext uri="{28A0092B-C50C-407E-A947-70E740481C1C}">
+                <a14:useLocalDpi xmlns:a14="http://schemas.microsoft.com/office/drawing/2010/main" val="0"/>
+              </a:ext>
+            </a:extLst>
+          </a:blip>
+          <a:stretch>
+            <a:fillRect/>
+          </a:stretch>
+        </p:blipFill>
+        <p:spPr>
+          <a:xfrm>
+            <a:off x="4950265" y="1830998"/>
+            <a:ext cx="3928973" cy="2716660"/>
           </a:xfrm>
           <a:prstGeom prst="rect">
             <a:avLst/>
@@ -1873,7 +1950,7 @@
     </p:spTree>
     <p:extLst>
       <p:ext uri="{BB962C8B-B14F-4D97-AF65-F5344CB8AC3E}">
-        <p14:creationId xmlns:p14="http://schemas.microsoft.com/office/powerpoint/2010/main" val="3350102094"/>
+        <p14:creationId xmlns:p14="http://schemas.microsoft.com/office/powerpoint/2010/main" val="727705871"/>
       </p:ext>
     </p:extLst>
   </p:cSld>

</xml_diff>